<commit_message>
add hlsl-dxil-remove-discards && dxil-gvn-hoist
</commit_message>
<xml_diff>
--- a/DirectXShaderCompiler.pptx
+++ b/DirectXShaderCompiler.pptx
@@ -5,7 +5,7 @@
     <p:sldMasterId id="2147483648" r:id="rId1"/>
   </p:sldMasterIdLst>
   <p:notesMasterIdLst>
-    <p:notesMasterId r:id="rId9"/>
+    <p:notesMasterId r:id="rId13"/>
   </p:notesMasterIdLst>
   <p:sldIdLst>
     <p:sldId id="256" r:id="rId2"/>
@@ -15,6 +15,10 @@
     <p:sldId id="260" r:id="rId6"/>
     <p:sldId id="261" r:id="rId7"/>
     <p:sldId id="262" r:id="rId8"/>
+    <p:sldId id="263" r:id="rId9"/>
+    <p:sldId id="264" r:id="rId10"/>
+    <p:sldId id="265" r:id="rId11"/>
+    <p:sldId id="266" r:id="rId12"/>
   </p:sldIdLst>
   <p:sldSz cx="12192000" cy="6858000"/>
   <p:notesSz cx="6858000" cy="9144000"/>
@@ -133,9 +137,16 @@
           <p14:sldIdLst>
             <p14:sldId id="261"/>
             <p14:sldId id="262"/>
+            <p14:sldId id="263"/>
+            <p14:sldId id="264"/>
+            <p14:sldId id="265"/>
+            <p14:sldId id="266"/>
           </p14:sldIdLst>
         </p14:section>
       </p14:sectionLst>
+    </p:ext>
+    <p:ext uri="{EFAFB233-063F-42B5-8137-9DF3F51BA10A}">
+      <p15:sldGuideLst xmlns:p15="http://schemas.microsoft.com/office/powerpoint/2012/main"/>
     </p:ext>
   </p:extLst>
 </p:presentation>
@@ -488,6 +499,224 @@
     </a:lvl9pPr>
   </p:notesStyle>
 </p:notesMaster>
+</file>
+
+<file path=ppt/notesSlides/notesSlide1.xml><?xml version="1.0" encoding="utf-8"?>
+<p:notes xmlns:a="http://schemas.openxmlformats.org/drawingml/2006/main" xmlns:r="http://schemas.openxmlformats.org/officeDocument/2006/relationships" xmlns:p="http://schemas.openxmlformats.org/presentationml/2006/main">
+  <p:cSld>
+    <p:spTree>
+      <p:nvGrpSpPr>
+        <p:cNvPr id="1" name=""/>
+        <p:cNvGrpSpPr/>
+        <p:nvPr/>
+      </p:nvGrpSpPr>
+      <p:grpSpPr>
+        <a:xfrm>
+          <a:off x="0" y="0"/>
+          <a:ext cx="0" cy="0"/>
+          <a:chOff x="0" y="0"/>
+          <a:chExt cx="0" cy="0"/>
+        </a:xfrm>
+      </p:grpSpPr>
+      <p:sp>
+        <p:nvSpPr>
+          <p:cNvPr id="2" name="幻灯片图像占位符 1"/>
+          <p:cNvSpPr>
+            <a:spLocks noGrp="1" noRot="1" noChangeAspect="1"/>
+          </p:cNvSpPr>
+          <p:nvPr>
+            <p:ph type="sldImg"/>
+          </p:nvPr>
+        </p:nvSpPr>
+        <p:spPr/>
+      </p:sp>
+      <p:sp>
+        <p:nvSpPr>
+          <p:cNvPr id="3" name="备注占位符 2"/>
+          <p:cNvSpPr>
+            <a:spLocks noGrp="1"/>
+          </p:cNvSpPr>
+          <p:nvPr>
+            <p:ph type="body" idx="1"/>
+          </p:nvPr>
+        </p:nvSpPr>
+        <p:spPr/>
+        <p:txBody>
+          <a:bodyPr/>
+          <a:lstStyle/>
+          <a:p>
+            <a:r>
+              <a:rPr lang="en-US" altLang="zh-CN" sz="1200" b="0" i="0" kern="1200" dirty="0">
+                <a:solidFill>
+                  <a:schemeClr val="tx1"/>
+                </a:solidFill>
+                <a:effectLst/>
+                <a:latin typeface="+mn-lt"/>
+                <a:ea typeface="+mn-ea"/>
+                <a:cs typeface="+mn-cs"/>
+              </a:rPr>
+              <a:t>Requirement:</a:t>
+            </a:r>
+          </a:p>
+          <a:p>
+            <a:r>
+              <a:rPr lang="en-US" altLang="zh-CN" sz="1200" b="0" i="0" kern="1200" dirty="0">
+                <a:solidFill>
+                  <a:schemeClr val="tx1"/>
+                </a:solidFill>
+                <a:effectLst/>
+                <a:latin typeface="+mn-lt"/>
+                <a:ea typeface="+mn-ea"/>
+                <a:cs typeface="+mn-cs"/>
+              </a:rPr>
+              <a:t>(1) diverge no later than the immediate dominator and </a:t>
+            </a:r>
+            <a:r>
+              <a:rPr lang="en-US" altLang="zh-CN" sz="1200" b="0" i="0" kern="1200" dirty="0" err="1">
+                <a:solidFill>
+                  <a:schemeClr val="tx1"/>
+                </a:solidFill>
+                <a:effectLst/>
+                <a:latin typeface="+mn-lt"/>
+                <a:ea typeface="+mn-ea"/>
+                <a:cs typeface="+mn-cs"/>
+              </a:rPr>
+              <a:t>reconverge</a:t>
+            </a:r>
+            <a:r>
+              <a:rPr lang="en-US" altLang="zh-CN" sz="1200" b="0" i="0" kern="1200" dirty="0">
+                <a:solidFill>
+                  <a:schemeClr val="tx1"/>
+                </a:solidFill>
+                <a:effectLst/>
+                <a:latin typeface="+mn-lt"/>
+                <a:ea typeface="+mn-ea"/>
+                <a:cs typeface="+mn-cs"/>
+              </a:rPr>
+              <a:t> no earlier than the immediate post-dominator.</a:t>
+            </a:r>
+            <a:endParaRPr lang="zh-CN" altLang="en-US" dirty="0"/>
+          </a:p>
+        </p:txBody>
+      </p:sp>
+      <p:sp>
+        <p:nvSpPr>
+          <p:cNvPr id="4" name="灯片编号占位符 3"/>
+          <p:cNvSpPr>
+            <a:spLocks noGrp="1"/>
+          </p:cNvSpPr>
+          <p:nvPr>
+            <p:ph type="sldNum" sz="quarter" idx="5"/>
+          </p:nvPr>
+        </p:nvSpPr>
+        <p:spPr/>
+        <p:txBody>
+          <a:bodyPr/>
+          <a:lstStyle/>
+          <a:p>
+            <a:fld id="{F5829D85-0A7A-48F7-97C5-A46B5EAC4E80}" type="slidenum">
+              <a:rPr lang="zh-CN" altLang="en-US" smtClean="0"/>
+              <a:t>7</a:t>
+            </a:fld>
+            <a:endParaRPr lang="zh-CN" altLang="en-US"/>
+          </a:p>
+        </p:txBody>
+      </p:sp>
+    </p:spTree>
+    <p:extLst>
+      <p:ext uri="{BB962C8B-B14F-4D97-AF65-F5344CB8AC3E}">
+        <p14:creationId xmlns:p14="http://schemas.microsoft.com/office/powerpoint/2010/main" val="1625722584"/>
+      </p:ext>
+    </p:extLst>
+  </p:cSld>
+  <p:clrMapOvr>
+    <a:masterClrMapping/>
+  </p:clrMapOvr>
+</p:notes>
+</file>
+
+<file path=ppt/notesSlides/notesSlide2.xml><?xml version="1.0" encoding="utf-8"?>
+<p:notes xmlns:a="http://schemas.openxmlformats.org/drawingml/2006/main" xmlns:r="http://schemas.openxmlformats.org/officeDocument/2006/relationships" xmlns:p="http://schemas.openxmlformats.org/presentationml/2006/main">
+  <p:cSld>
+    <p:spTree>
+      <p:nvGrpSpPr>
+        <p:cNvPr id="1" name=""/>
+        <p:cNvGrpSpPr/>
+        <p:nvPr/>
+      </p:nvGrpSpPr>
+      <p:grpSpPr>
+        <a:xfrm>
+          <a:off x="0" y="0"/>
+          <a:ext cx="0" cy="0"/>
+          <a:chOff x="0" y="0"/>
+          <a:chExt cx="0" cy="0"/>
+        </a:xfrm>
+      </p:grpSpPr>
+      <p:sp>
+        <p:nvSpPr>
+          <p:cNvPr id="2" name="幻灯片图像占位符 1"/>
+          <p:cNvSpPr>
+            <a:spLocks noGrp="1" noRot="1" noChangeAspect="1"/>
+          </p:cNvSpPr>
+          <p:nvPr>
+            <p:ph type="sldImg"/>
+          </p:nvPr>
+        </p:nvSpPr>
+        <p:spPr/>
+      </p:sp>
+      <p:sp>
+        <p:nvSpPr>
+          <p:cNvPr id="3" name="备注占位符 2"/>
+          <p:cNvSpPr>
+            <a:spLocks noGrp="1"/>
+          </p:cNvSpPr>
+          <p:nvPr>
+            <p:ph type="body" idx="1"/>
+          </p:nvPr>
+        </p:nvSpPr>
+        <p:spPr/>
+        <p:txBody>
+          <a:bodyPr/>
+          <a:lstStyle/>
+          <a:p>
+            <a:endParaRPr lang="zh-CN" altLang="en-US" dirty="0"/>
+          </a:p>
+        </p:txBody>
+      </p:sp>
+      <p:sp>
+        <p:nvSpPr>
+          <p:cNvPr id="4" name="灯片编号占位符 3"/>
+          <p:cNvSpPr>
+            <a:spLocks noGrp="1"/>
+          </p:cNvSpPr>
+          <p:nvPr>
+            <p:ph type="sldNum" sz="quarter" idx="5"/>
+          </p:nvPr>
+        </p:nvSpPr>
+        <p:spPr/>
+        <p:txBody>
+          <a:bodyPr/>
+          <a:lstStyle/>
+          <a:p>
+            <a:fld id="{F5829D85-0A7A-48F7-97C5-A46B5EAC4E80}" type="slidenum">
+              <a:rPr lang="zh-CN" altLang="en-US" smtClean="0"/>
+              <a:t>10</a:t>
+            </a:fld>
+            <a:endParaRPr lang="zh-CN" altLang="en-US"/>
+          </a:p>
+        </p:txBody>
+      </p:sp>
+    </p:spTree>
+    <p:extLst>
+      <p:ext uri="{BB962C8B-B14F-4D97-AF65-F5344CB8AC3E}">
+        <p14:creationId xmlns:p14="http://schemas.microsoft.com/office/powerpoint/2010/main" val="678882287"/>
+      </p:ext>
+    </p:extLst>
+  </p:cSld>
+  <p:clrMapOvr>
+    <a:masterClrMapping/>
+  </p:clrMapOvr>
+</p:notes>
 </file>
 
 <file path=ppt/slideLayouts/slideLayout1.xml><?xml version="1.0" encoding="utf-8"?>
@@ -3798,6 +4027,426 @@
 </p:sld>
 </file>
 
+<file path=ppt/slides/slide10.xml><?xml version="1.0" encoding="utf-8"?>
+<p:sld xmlns:a="http://schemas.openxmlformats.org/drawingml/2006/main" xmlns:r="http://schemas.openxmlformats.org/officeDocument/2006/relationships" xmlns:p="http://schemas.openxmlformats.org/presentationml/2006/main">
+  <p:cSld>
+    <p:spTree>
+      <p:nvGrpSpPr>
+        <p:cNvPr id="1" name=""/>
+        <p:cNvGrpSpPr/>
+        <p:nvPr/>
+      </p:nvGrpSpPr>
+      <p:grpSpPr>
+        <a:xfrm>
+          <a:off x="0" y="0"/>
+          <a:ext cx="0" cy="0"/>
+          <a:chOff x="0" y="0"/>
+          <a:chExt cx="0" cy="0"/>
+        </a:xfrm>
+      </p:grpSpPr>
+      <p:sp>
+        <p:nvSpPr>
+          <p:cNvPr id="2" name="标题 1">
+            <a:extLst>
+              <a:ext uri="{FF2B5EF4-FFF2-40B4-BE49-F238E27FC236}">
+                <a16:creationId xmlns:a16="http://schemas.microsoft.com/office/drawing/2014/main" id="{AE57A044-59F0-4501-98B9-FB987A27513A}"/>
+              </a:ext>
+            </a:extLst>
+          </p:cNvPr>
+          <p:cNvSpPr>
+            <a:spLocks noGrp="1"/>
+          </p:cNvSpPr>
+          <p:nvPr>
+            <p:ph type="title"/>
+          </p:nvPr>
+        </p:nvSpPr>
+        <p:spPr/>
+        <p:txBody>
+          <a:bodyPr/>
+          <a:lstStyle/>
+          <a:p>
+            <a:r>
+              <a:rPr lang="en-US" altLang="zh-CN" dirty="0" err="1"/>
+              <a:t>hlsl</a:t>
+            </a:r>
+            <a:r>
+              <a:rPr lang="en-US" altLang="zh-CN" dirty="0"/>
+              <a:t>-</a:t>
+            </a:r>
+            <a:r>
+              <a:rPr lang="en-US" altLang="zh-CN" dirty="0" err="1"/>
+              <a:t>dxil</a:t>
+            </a:r>
+            <a:r>
+              <a:rPr lang="en-US" altLang="zh-CN" dirty="0"/>
+              <a:t>-remove-discards</a:t>
+            </a:r>
+            <a:endParaRPr lang="zh-CN" altLang="en-US" dirty="0"/>
+          </a:p>
+        </p:txBody>
+      </p:sp>
+      <p:sp>
+        <p:nvSpPr>
+          <p:cNvPr id="3" name="内容占位符 2">
+            <a:extLst>
+              <a:ext uri="{FF2B5EF4-FFF2-40B4-BE49-F238E27FC236}">
+                <a16:creationId xmlns:a16="http://schemas.microsoft.com/office/drawing/2014/main" id="{49605987-3CF3-4E58-8FA9-016F57612403}"/>
+              </a:ext>
+            </a:extLst>
+          </p:cNvPr>
+          <p:cNvSpPr>
+            <a:spLocks noGrp="1"/>
+          </p:cNvSpPr>
+          <p:nvPr>
+            <p:ph idx="1"/>
+          </p:nvPr>
+        </p:nvSpPr>
+        <p:spPr/>
+        <p:txBody>
+          <a:bodyPr/>
+          <a:lstStyle/>
+          <a:p>
+            <a:r>
+              <a:rPr lang="en-US" altLang="zh-CN" dirty="0" err="1"/>
+              <a:t>DxilRemoveDiscards</a:t>
+            </a:r>
+            <a:r>
+              <a:rPr lang="en-US" altLang="zh-CN" dirty="0"/>
+              <a:t> : </a:t>
+            </a:r>
+            <a:r>
+              <a:rPr lang="en-US" altLang="zh-CN" dirty="0" err="1"/>
+              <a:t>ModulePass</a:t>
+            </a:r>
+            <a:endParaRPr lang="en-US" altLang="zh-CN" dirty="0"/>
+          </a:p>
+          <a:p>
+            <a:r>
+              <a:rPr lang="en-US" altLang="zh-CN" dirty="0"/>
+              <a:t>Pass Feature: This pass removes all instances of the </a:t>
+            </a:r>
+            <a:r>
+              <a:rPr lang="en-US" altLang="zh-CN" dirty="0">
+                <a:solidFill>
+                  <a:srgbClr val="FF0000"/>
+                </a:solidFill>
+              </a:rPr>
+              <a:t>discard instruction</a:t>
+            </a:r>
+            <a:r>
+              <a:rPr lang="en-US" altLang="zh-CN" dirty="0"/>
+              <a:t> within the shader.</a:t>
+            </a:r>
+          </a:p>
+          <a:p>
+            <a:endParaRPr lang="en-US" altLang="zh-CN" dirty="0"/>
+          </a:p>
+          <a:p>
+            <a:endParaRPr lang="zh-CN" altLang="en-US" dirty="0"/>
+          </a:p>
+        </p:txBody>
+      </p:sp>
+      <p:pic>
+        <p:nvPicPr>
+          <p:cNvPr id="5" name="图片 4">
+            <a:extLst>
+              <a:ext uri="{FF2B5EF4-FFF2-40B4-BE49-F238E27FC236}">
+                <a16:creationId xmlns:a16="http://schemas.microsoft.com/office/drawing/2014/main" id="{460D2779-1334-41B2-BC66-41D5AEF9DCA9}"/>
+              </a:ext>
+            </a:extLst>
+          </p:cNvPr>
+          <p:cNvPicPr>
+            <a:picLocks noChangeAspect="1"/>
+          </p:cNvPicPr>
+          <p:nvPr/>
+        </p:nvPicPr>
+        <p:blipFill>
+          <a:blip r:embed="rId3"/>
+          <a:stretch>
+            <a:fillRect/>
+          </a:stretch>
+        </p:blipFill>
+        <p:spPr>
+          <a:xfrm>
+            <a:off x="1047442" y="3898055"/>
+            <a:ext cx="9587817" cy="1777181"/>
+          </a:xfrm>
+          <a:prstGeom prst="rect">
+            <a:avLst/>
+          </a:prstGeom>
+        </p:spPr>
+      </p:pic>
+    </p:spTree>
+    <p:extLst>
+      <p:ext uri="{BB962C8B-B14F-4D97-AF65-F5344CB8AC3E}">
+        <p14:creationId xmlns:p14="http://schemas.microsoft.com/office/powerpoint/2010/main" val="3301410468"/>
+      </p:ext>
+    </p:extLst>
+  </p:cSld>
+  <p:clrMapOvr>
+    <a:masterClrMapping/>
+  </p:clrMapOvr>
+</p:sld>
+</file>
+
+<file path=ppt/slides/slide11.xml><?xml version="1.0" encoding="utf-8"?>
+<p:sld xmlns:a="http://schemas.openxmlformats.org/drawingml/2006/main" xmlns:r="http://schemas.openxmlformats.org/officeDocument/2006/relationships" xmlns:p="http://schemas.openxmlformats.org/presentationml/2006/main">
+  <p:cSld>
+    <p:spTree>
+      <p:nvGrpSpPr>
+        <p:cNvPr id="1" name=""/>
+        <p:cNvGrpSpPr/>
+        <p:nvPr/>
+      </p:nvGrpSpPr>
+      <p:grpSpPr>
+        <a:xfrm>
+          <a:off x="0" y="0"/>
+          <a:ext cx="0" cy="0"/>
+          <a:chOff x="0" y="0"/>
+          <a:chExt cx="0" cy="0"/>
+        </a:xfrm>
+      </p:grpSpPr>
+      <p:sp>
+        <p:nvSpPr>
+          <p:cNvPr id="2" name="标题 1">
+            <a:extLst>
+              <a:ext uri="{FF2B5EF4-FFF2-40B4-BE49-F238E27FC236}">
+                <a16:creationId xmlns:a16="http://schemas.microsoft.com/office/drawing/2014/main" id="{5F617E5B-55C0-4EDC-A161-4A727B7E4150}"/>
+              </a:ext>
+            </a:extLst>
+          </p:cNvPr>
+          <p:cNvSpPr>
+            <a:spLocks noGrp="1"/>
+          </p:cNvSpPr>
+          <p:nvPr>
+            <p:ph type="title"/>
+          </p:nvPr>
+        </p:nvSpPr>
+        <p:spPr/>
+        <p:txBody>
+          <a:bodyPr/>
+          <a:lstStyle/>
+          <a:p>
+            <a:r>
+              <a:rPr lang="en-US" altLang="zh-CN" dirty="0" err="1"/>
+              <a:t>dxil</a:t>
+            </a:r>
+            <a:r>
+              <a:rPr lang="en-US" altLang="zh-CN" dirty="0"/>
+              <a:t>-</a:t>
+            </a:r>
+            <a:r>
+              <a:rPr lang="en-US" altLang="zh-CN" dirty="0" err="1"/>
+              <a:t>gvn</a:t>
+            </a:r>
+            <a:r>
+              <a:rPr lang="en-US" altLang="zh-CN" dirty="0"/>
+              <a:t>-hoist</a:t>
+            </a:r>
+            <a:endParaRPr lang="zh-CN" altLang="en-US" dirty="0"/>
+          </a:p>
+        </p:txBody>
+      </p:sp>
+      <p:sp>
+        <p:nvSpPr>
+          <p:cNvPr id="3" name="内容占位符 2">
+            <a:extLst>
+              <a:ext uri="{FF2B5EF4-FFF2-40B4-BE49-F238E27FC236}">
+                <a16:creationId xmlns:a16="http://schemas.microsoft.com/office/drawing/2014/main" id="{A9B8E806-6A1E-4939-8E1C-97406DA88563}"/>
+              </a:ext>
+            </a:extLst>
+          </p:cNvPr>
+          <p:cNvSpPr>
+            <a:spLocks noGrp="1"/>
+          </p:cNvSpPr>
+          <p:nvPr>
+            <p:ph idx="1"/>
+          </p:nvPr>
+        </p:nvSpPr>
+        <p:spPr/>
+        <p:txBody>
+          <a:bodyPr>
+            <a:normAutofit/>
+          </a:bodyPr>
+          <a:lstStyle/>
+          <a:p>
+            <a:r>
+              <a:rPr lang="en-US" altLang="zh-CN" dirty="0" err="1"/>
+              <a:t>DxilSimpleGVNHoist</a:t>
+            </a:r>
+            <a:r>
+              <a:rPr lang="en-US" altLang="zh-CN" dirty="0"/>
+              <a:t> : </a:t>
+            </a:r>
+            <a:r>
+              <a:rPr lang="en-US" altLang="zh-CN" dirty="0" err="1"/>
+              <a:t>FunctionPass</a:t>
+            </a:r>
+            <a:endParaRPr lang="en-US" altLang="zh-CN" dirty="0"/>
+          </a:p>
+          <a:p>
+            <a:r>
+              <a:rPr lang="en-US" altLang="zh-CN" dirty="0"/>
+              <a:t>Pass Feature: Reduce code size for pattern like this:</a:t>
+            </a:r>
+          </a:p>
+          <a:p>
+            <a:pPr marL="457200" lvl="1" indent="0">
+              <a:buNone/>
+            </a:pPr>
+            <a:r>
+              <a:rPr lang="en-US" altLang="zh-CN" dirty="0"/>
+              <a:t>if (</a:t>
+            </a:r>
+            <a:r>
+              <a:rPr lang="en-US" altLang="zh-CN" dirty="0" err="1"/>
+              <a:t>a.x</a:t>
+            </a:r>
+            <a:r>
+              <a:rPr lang="en-US" altLang="zh-CN" dirty="0"/>
+              <a:t> &gt; 0) {</a:t>
+            </a:r>
+          </a:p>
+          <a:p>
+            <a:pPr marL="457200" lvl="1" indent="0">
+              <a:buNone/>
+            </a:pPr>
+            <a:r>
+              <a:rPr lang="en-US" altLang="zh-CN" dirty="0"/>
+              <a:t>  r = </a:t>
+            </a:r>
+            <a:r>
+              <a:rPr lang="en-US" altLang="zh-CN" dirty="0" err="1"/>
+              <a:t>tex.Sample</a:t>
+            </a:r>
+            <a:r>
+              <a:rPr lang="en-US" altLang="zh-CN" dirty="0"/>
+              <a:t>(ss, </a:t>
+            </a:r>
+            <a:r>
+              <a:rPr lang="en-US" altLang="zh-CN" dirty="0" err="1"/>
+              <a:t>uv</a:t>
+            </a:r>
+            <a:r>
+              <a:rPr lang="en-US" altLang="zh-CN" dirty="0"/>
+              <a:t>)-1;</a:t>
+            </a:r>
+          </a:p>
+          <a:p>
+            <a:pPr marL="457200" lvl="1" indent="0">
+              <a:buNone/>
+            </a:pPr>
+            <a:r>
+              <a:rPr lang="en-US" altLang="zh-CN" dirty="0"/>
+              <a:t> } else {</a:t>
+            </a:r>
+          </a:p>
+          <a:p>
+            <a:pPr marL="457200" lvl="1" indent="0">
+              <a:buNone/>
+            </a:pPr>
+            <a:r>
+              <a:rPr lang="en-US" altLang="zh-CN" dirty="0"/>
+              <a:t>  if (</a:t>
+            </a:r>
+            <a:r>
+              <a:rPr lang="en-US" altLang="zh-CN" dirty="0" err="1"/>
+              <a:t>a.y</a:t>
+            </a:r>
+            <a:r>
+              <a:rPr lang="en-US" altLang="zh-CN" dirty="0"/>
+              <a:t> &gt; 0)</a:t>
+            </a:r>
+          </a:p>
+          <a:p>
+            <a:pPr marL="457200" lvl="1" indent="0">
+              <a:buNone/>
+            </a:pPr>
+            <a:r>
+              <a:rPr lang="en-US" altLang="zh-CN" dirty="0"/>
+              <a:t>    r = </a:t>
+            </a:r>
+            <a:r>
+              <a:rPr lang="en-US" altLang="zh-CN" dirty="0" err="1"/>
+              <a:t>tex.Sample</a:t>
+            </a:r>
+            <a:r>
+              <a:rPr lang="en-US" altLang="zh-CN" dirty="0"/>
+              <a:t>(ss, </a:t>
+            </a:r>
+            <a:r>
+              <a:rPr lang="en-US" altLang="zh-CN" dirty="0" err="1"/>
+              <a:t>uv</a:t>
+            </a:r>
+            <a:r>
+              <a:rPr lang="en-US" altLang="zh-CN" dirty="0"/>
+              <a:t>);</a:t>
+            </a:r>
+          </a:p>
+          <a:p>
+            <a:pPr marL="457200" lvl="1" indent="0">
+              <a:buNone/>
+            </a:pPr>
+            <a:r>
+              <a:rPr lang="en-US" altLang="zh-CN" dirty="0"/>
+              <a:t>  else</a:t>
+            </a:r>
+          </a:p>
+          <a:p>
+            <a:pPr marL="457200" lvl="1" indent="0">
+              <a:buNone/>
+            </a:pPr>
+            <a:r>
+              <a:rPr lang="en-US" altLang="zh-CN" dirty="0"/>
+              <a:t>   r = </a:t>
+            </a:r>
+            <a:r>
+              <a:rPr lang="en-US" altLang="zh-CN" dirty="0" err="1"/>
+              <a:t>tex.Sample</a:t>
+            </a:r>
+            <a:r>
+              <a:rPr lang="en-US" altLang="zh-CN" dirty="0"/>
+              <a:t>(ss, </a:t>
+            </a:r>
+            <a:r>
+              <a:rPr lang="en-US" altLang="zh-CN" dirty="0" err="1"/>
+              <a:t>uv</a:t>
+            </a:r>
+            <a:r>
+              <a:rPr lang="en-US" altLang="zh-CN" dirty="0"/>
+              <a:t>) + 3;</a:t>
+            </a:r>
+          </a:p>
+          <a:p>
+            <a:pPr marL="457200" lvl="1" indent="0">
+              <a:buNone/>
+            </a:pPr>
+            <a:r>
+              <a:rPr lang="en-US" altLang="zh-CN" dirty="0"/>
+              <a:t> }</a:t>
+            </a:r>
+          </a:p>
+          <a:p>
+            <a:endParaRPr lang="en-US" altLang="zh-CN" dirty="0"/>
+          </a:p>
+          <a:p>
+            <a:endParaRPr lang="zh-CN" altLang="en-US" dirty="0"/>
+          </a:p>
+        </p:txBody>
+      </p:sp>
+    </p:spTree>
+    <p:extLst>
+      <p:ext uri="{BB962C8B-B14F-4D97-AF65-F5344CB8AC3E}">
+        <p14:creationId xmlns:p14="http://schemas.microsoft.com/office/powerpoint/2010/main" val="1961304159"/>
+      </p:ext>
+    </p:extLst>
+  </p:cSld>
+  <p:clrMapOvr>
+    <a:masterClrMapping/>
+  </p:clrMapOvr>
+</p:sld>
+</file>
+
 <file path=ppt/slides/slide2.xml><?xml version="1.0" encoding="utf-8"?>
 <p:sld xmlns:a="http://schemas.openxmlformats.org/drawingml/2006/main" xmlns:r="http://schemas.openxmlformats.org/officeDocument/2006/relationships" xmlns:p="http://schemas.openxmlformats.org/presentationml/2006/main">
   <p:cSld>
@@ -3919,18 +4568,29 @@
               <a:rPr lang="en-US" altLang="zh-CN" dirty="0" err="1"/>
               <a:t>addrspacecast</a:t>
             </a:r>
+            <a:r>
+              <a:rPr lang="en-US" altLang="zh-CN" dirty="0"/>
+              <a:t> (</a:t>
+            </a:r>
+            <a:r>
+              <a:rPr lang="en-US" altLang="zh-CN" dirty="0" err="1"/>
+              <a:t>ModulePass</a:t>
+            </a:r>
+            <a:r>
+              <a:rPr lang="en-US" altLang="zh-CN" dirty="0"/>
+              <a:t>)</a:t>
+            </a:r>
+          </a:p>
+          <a:p>
+            <a:r>
+              <a:rPr lang="en-US" altLang="zh-CN" dirty="0" err="1"/>
+              <a:t>hlsl-dxil-constantcolor</a:t>
+            </a:r>
             <a:endParaRPr lang="en-US" altLang="zh-CN" dirty="0"/>
           </a:p>
           <a:p>
             <a:r>
               <a:rPr lang="en-US" altLang="zh-CN" dirty="0" err="1"/>
-              <a:t>hlsl-dxil-constantcolor</a:t>
-            </a:r>
-            <a:endParaRPr lang="en-US" altLang="zh-CN" dirty="0"/>
-          </a:p>
-          <a:p>
-            <a:r>
-              <a:rPr lang="en-US" altLang="zh-CN" dirty="0" err="1"/>
               <a:t>hlsl</a:t>
             </a:r>
             <a:r>
@@ -3943,11 +4603,11 @@
             </a:r>
             <a:r>
               <a:rPr lang="en-US" altLang="zh-CN" dirty="0"/>
-              <a:t>-convergent-clear (</a:t>
-            </a:r>
-            <a:r>
-              <a:rPr lang="zh-CN" altLang="en-US" dirty="0"/>
-              <a:t>√</a:t>
+              <a:t>-convergent-clear    (</a:t>
+            </a:r>
+            <a:r>
+              <a:rPr lang="en-US" altLang="zh-CN" dirty="0" err="1"/>
+              <a:t>ModulePass</a:t>
             </a:r>
             <a:r>
               <a:rPr lang="en-US" altLang="zh-CN" dirty="0"/>
@@ -3969,11 +4629,11 @@
             </a:r>
             <a:r>
               <a:rPr lang="en-US" altLang="zh-CN" dirty="0"/>
-              <a:t>-convergent-mask (</a:t>
-            </a:r>
-            <a:r>
-              <a:rPr lang="zh-CN" altLang="en-US" dirty="0"/>
-              <a:t>√</a:t>
+              <a:t>-convergent-mask   (</a:t>
+            </a:r>
+            <a:r>
+              <a:rPr lang="en-US" altLang="zh-CN" dirty="0" err="1"/>
+              <a:t>ModulePass</a:t>
             </a:r>
             <a:r>
               <a:rPr lang="en-US" altLang="zh-CN" dirty="0"/>
@@ -4172,8 +4832,8 @@
               <a:t>-force-early-z  (</a:t>
             </a:r>
             <a:r>
-              <a:rPr lang="zh-CN" altLang="en-US" dirty="0"/>
-              <a:t>√</a:t>
+              <a:rPr lang="en-US" altLang="zh-CN" dirty="0" err="1"/>
+              <a:t>ModulePass</a:t>
             </a:r>
             <a:r>
               <a:rPr lang="en-US" altLang="zh-CN" dirty="0"/>
@@ -4303,7 +4963,15 @@
             </a:r>
             <a:r>
               <a:rPr lang="en-US" altLang="zh-CN" dirty="0"/>
-              <a:t>-preserve-all-outputs</a:t>
+              <a:t>-preserve-all-outputs      (</a:t>
+            </a:r>
+            <a:r>
+              <a:rPr lang="en-US" altLang="zh-CN" dirty="0" err="1"/>
+              <a:t>FunctionPass</a:t>
+            </a:r>
+            <a:r>
+              <a:rPr lang="en-US" altLang="zh-CN" dirty="0"/>
+              <a:t>)</a:t>
             </a:r>
           </a:p>
           <a:p>
@@ -4444,7 +5112,15 @@
             </a:r>
             <a:r>
               <a:rPr lang="en-US" altLang="zh-CN" dirty="0"/>
-              <a:t>-to-single</a:t>
+              <a:t>-to-single  (</a:t>
+            </a:r>
+            <a:r>
+              <a:rPr lang="en-US" altLang="zh-CN" dirty="0" err="1"/>
+              <a:t>ModulePass</a:t>
+            </a:r>
+            <a:r>
+              <a:rPr lang="en-US" altLang="zh-CN" dirty="0"/>
+              <a:t>)</a:t>
             </a:r>
           </a:p>
           <a:p>
@@ -4462,7 +5138,15 @@
             </a:r>
             <a:r>
               <a:rPr lang="en-US" altLang="zh-CN" dirty="0"/>
-              <a:t>-remove-discards</a:t>
+              <a:t>-remove-discards  (</a:t>
+            </a:r>
+            <a:r>
+              <a:rPr lang="en-US" altLang="zh-CN" dirty="0" err="1"/>
+              <a:t>ModulePass</a:t>
+            </a:r>
+            <a:r>
+              <a:rPr lang="en-US" altLang="zh-CN" dirty="0"/>
+              <a:t>)</a:t>
             </a:r>
           </a:p>
           <a:p>
@@ -4699,7 +5383,15 @@
             </a:r>
             <a:r>
               <a:rPr lang="en-US" altLang="zh-CN" dirty="0"/>
-              <a:t>-hoist</a:t>
+              <a:t>-hoist (</a:t>
+            </a:r>
+            <a:r>
+              <a:rPr lang="en-US" altLang="zh-CN" dirty="0" err="1"/>
+              <a:t>FunctionPass</a:t>
+            </a:r>
+            <a:r>
+              <a:rPr lang="en-US" altLang="zh-CN" dirty="0"/>
+              <a:t>)</a:t>
             </a:r>
           </a:p>
           <a:p>
@@ -4827,46 +5519,46 @@
           <a:lstStyle/>
           <a:p>
             <a:r>
-              <a:rPr lang="en-US" altLang="zh-CN" sz="2000" dirty="0" err="1"/>
+              <a:rPr lang="en-US" altLang="zh-CN" sz="2400" dirty="0" err="1"/>
               <a:t>DxilForceEarlyZ</a:t>
             </a:r>
             <a:r>
-              <a:rPr lang="en-US" altLang="zh-CN" sz="2000" dirty="0"/>
+              <a:rPr lang="en-US" altLang="zh-CN" sz="2400" dirty="0"/>
               <a:t> : </a:t>
             </a:r>
             <a:r>
-              <a:rPr lang="en-US" altLang="zh-CN" sz="2000" dirty="0" err="1"/>
+              <a:rPr lang="en-US" altLang="zh-CN" sz="2400" dirty="0" err="1"/>
               <a:t>ModulePass</a:t>
             </a:r>
-            <a:endParaRPr lang="en-US" altLang="zh-CN" sz="2000" dirty="0"/>
-          </a:p>
-          <a:p>
-            <a:r>
-              <a:rPr lang="en-US" altLang="zh-CN" sz="2000" dirty="0"/>
+            <a:endParaRPr lang="en-US" altLang="zh-CN" sz="2400" dirty="0"/>
+          </a:p>
+          <a:p>
+            <a:r>
+              <a:rPr lang="en-US" altLang="zh-CN" sz="2400" dirty="0"/>
               <a:t>Pass Feature: </a:t>
             </a:r>
             <a:r>
-              <a:rPr lang="zh-CN" altLang="en-US" sz="2000" dirty="0"/>
+              <a:rPr lang="zh-CN" altLang="en-US" sz="2400" dirty="0"/>
               <a:t>设置</a:t>
             </a:r>
             <a:r>
-              <a:rPr lang="en-US" altLang="zh-CN" sz="2000" dirty="0" err="1"/>
+              <a:rPr lang="en-US" altLang="zh-CN" sz="2400" dirty="0" err="1"/>
               <a:t>DxilModule</a:t>
             </a:r>
             <a:r>
-              <a:rPr lang="en-US" altLang="zh-CN" sz="2000" dirty="0"/>
+              <a:rPr lang="en-US" altLang="zh-CN" sz="2400" dirty="0"/>
               <a:t> </a:t>
             </a:r>
             <a:r>
-              <a:rPr lang="zh-CN" altLang="en-US" sz="2000" dirty="0"/>
+              <a:rPr lang="zh-CN" altLang="en-US" sz="2400" dirty="0"/>
               <a:t>的 </a:t>
             </a:r>
             <a:r>
-              <a:rPr lang="en-US" altLang="zh-CN" sz="2000" dirty="0" err="1"/>
+              <a:rPr lang="en-US" altLang="zh-CN" sz="2400" dirty="0" err="1"/>
               <a:t>EarlyDepthStencil</a:t>
             </a:r>
             <a:r>
-              <a:rPr lang="en-US" altLang="zh-CN" sz="2000" dirty="0"/>
+              <a:rPr lang="en-US" altLang="zh-CN" sz="2400" dirty="0"/>
               <a:t> Shader Flag</a:t>
             </a:r>
           </a:p>
@@ -4874,37 +5566,40 @@
             <a:pPr marL="0" indent="0">
               <a:buNone/>
             </a:pPr>
-            <a:endParaRPr lang="en-US" altLang="zh-CN" sz="2000" dirty="0"/>
+            <a:endParaRPr lang="en-US" altLang="zh-CN" sz="2400" dirty="0"/>
           </a:p>
           <a:p>
             <a:pPr marL="0" indent="0">
               <a:buNone/>
             </a:pPr>
-            <a:endParaRPr lang="en-US" altLang="zh-CN" sz="2000" dirty="0"/>
+            <a:r>
+              <a:rPr lang="en-US" altLang="zh-CN" sz="2400" dirty="0"/>
+              <a:t>bool </a:t>
+            </a:r>
+            <a:r>
+              <a:rPr lang="en-US" altLang="zh-CN" sz="2400" dirty="0" err="1"/>
+              <a:t>DxilForceEarlyZ</a:t>
+            </a:r>
+            <a:r>
+              <a:rPr lang="en-US" altLang="zh-CN" sz="2400" dirty="0"/>
+              <a:t>::</a:t>
+            </a:r>
+            <a:r>
+              <a:rPr lang="en-US" altLang="zh-CN" sz="2400" dirty="0" err="1"/>
+              <a:t>runOnModule</a:t>
+            </a:r>
+            <a:r>
+              <a:rPr lang="en-US" altLang="zh-CN" sz="2400" dirty="0"/>
+              <a:t>(Module &amp;M) {</a:t>
+            </a:r>
           </a:p>
           <a:p>
             <a:pPr marL="0" indent="0">
               <a:buNone/>
             </a:pPr>
             <a:r>
-              <a:rPr lang="en-US" altLang="zh-CN" sz="2000" dirty="0"/>
-              <a:t>bool </a:t>
-            </a:r>
-            <a:r>
-              <a:rPr lang="en-US" altLang="zh-CN" sz="2000" dirty="0" err="1"/>
-              <a:t>DxilForceEarlyZ</a:t>
-            </a:r>
-            <a:r>
-              <a:rPr lang="en-US" altLang="zh-CN" sz="2000" dirty="0"/>
-              <a:t>::</a:t>
-            </a:r>
-            <a:r>
-              <a:rPr lang="en-US" altLang="zh-CN" sz="2000" dirty="0" err="1"/>
-              <a:t>runOnModule</a:t>
-            </a:r>
-            <a:r>
-              <a:rPr lang="en-US" altLang="zh-CN" sz="2000" dirty="0"/>
-              <a:t>(Module &amp;M) {</a:t>
+              <a:rPr lang="en-US" altLang="zh-CN" sz="2400" dirty="0"/>
+              <a:t>  // This pass adds the force-early-z flag</a:t>
             </a:r>
           </a:p>
           <a:p>
@@ -4912,8 +5607,24 @@
               <a:buNone/>
             </a:pPr>
             <a:r>
-              <a:rPr lang="en-US" altLang="zh-CN" sz="2000" dirty="0"/>
-              <a:t>  // This pass adds the force-early-z flag</a:t>
+              <a:rPr lang="en-US" altLang="zh-CN" sz="2400" dirty="0"/>
+              <a:t>  </a:t>
+            </a:r>
+            <a:r>
+              <a:rPr lang="en-US" altLang="zh-CN" sz="2400" dirty="0" err="1"/>
+              <a:t>DxilModule</a:t>
+            </a:r>
+            <a:r>
+              <a:rPr lang="en-US" altLang="zh-CN" sz="2400" dirty="0"/>
+              <a:t> &amp;DM = </a:t>
+            </a:r>
+            <a:r>
+              <a:rPr lang="en-US" altLang="zh-CN" sz="2400" dirty="0" err="1"/>
+              <a:t>M.GetOrCreateDxilModule</a:t>
+            </a:r>
+            <a:r>
+              <a:rPr lang="en-US" altLang="zh-CN" sz="2400" dirty="0"/>
+              <a:t>();</a:t>
             </a:r>
           </a:p>
           <a:p>
@@ -4921,40 +5632,15 @@
               <a:buNone/>
             </a:pPr>
             <a:r>
-              <a:rPr lang="en-US" altLang="zh-CN" sz="2000" dirty="0"/>
+              <a:rPr lang="en-US" altLang="zh-CN" sz="2400" dirty="0"/>
               <a:t>  </a:t>
             </a:r>
             <a:r>
-              <a:rPr lang="en-US" altLang="zh-CN" sz="2000" dirty="0" err="1"/>
-              <a:t>DxilModule</a:t>
-            </a:r>
-            <a:r>
-              <a:rPr lang="en-US" altLang="zh-CN" sz="2000" dirty="0"/>
-              <a:t> &amp;DM = </a:t>
-            </a:r>
-            <a:r>
-              <a:rPr lang="en-US" altLang="zh-CN" sz="2000" dirty="0" err="1"/>
-              <a:t>M.GetOrCreateDxilModule</a:t>
-            </a:r>
-            <a:r>
-              <a:rPr lang="en-US" altLang="zh-CN" sz="2000" dirty="0"/>
-              <a:t>();</a:t>
-            </a:r>
-          </a:p>
-          <a:p>
-            <a:pPr marL="0" indent="0">
-              <a:buNone/>
-            </a:pPr>
-            <a:r>
-              <a:rPr lang="en-US" altLang="zh-CN" sz="2000" dirty="0"/>
-              <a:t>  </a:t>
-            </a:r>
-            <a:r>
-              <a:rPr lang="en-US" altLang="zh-CN" sz="2000" dirty="0" err="1"/>
+              <a:rPr lang="en-US" altLang="zh-CN" sz="2400" dirty="0" err="1"/>
               <a:t>DM.</a:t>
             </a:r>
             <a:r>
-              <a:rPr lang="en-US" altLang="zh-CN" sz="2000" dirty="0" err="1">
+              <a:rPr lang="en-US" altLang="zh-CN" sz="2400" dirty="0" err="1">
                 <a:solidFill>
                   <a:srgbClr val="FF0000"/>
                 </a:solidFill>
@@ -4962,11 +5648,11 @@
               <a:t>m_ShaderFlags</a:t>
             </a:r>
             <a:r>
-              <a:rPr lang="en-US" altLang="zh-CN" sz="2000" dirty="0" err="1"/>
+              <a:rPr lang="en-US" altLang="zh-CN" sz="2400" dirty="0" err="1"/>
               <a:t>.</a:t>
             </a:r>
             <a:r>
-              <a:rPr lang="en-US" altLang="zh-CN" sz="2000" dirty="0" err="1">
+              <a:rPr lang="en-US" altLang="zh-CN" sz="2400" dirty="0" err="1">
                 <a:solidFill>
                   <a:schemeClr val="accent6"/>
                 </a:solidFill>
@@ -4974,7 +5660,7 @@
               <a:t>SetForceEarlyDepthStencil</a:t>
             </a:r>
             <a:r>
-              <a:rPr lang="en-US" altLang="zh-CN" sz="2000" dirty="0"/>
+              <a:rPr lang="en-US" altLang="zh-CN" sz="2400" dirty="0"/>
               <a:t>(true);</a:t>
             </a:r>
           </a:p>
@@ -4983,15 +5669,15 @@
               <a:buNone/>
             </a:pPr>
             <a:r>
-              <a:rPr lang="en-US" altLang="zh-CN" sz="2000" dirty="0"/>
+              <a:rPr lang="en-US" altLang="zh-CN" sz="2400" dirty="0"/>
               <a:t>  </a:t>
             </a:r>
             <a:r>
-              <a:rPr lang="en-US" altLang="zh-CN" sz="2000" dirty="0" err="1"/>
+              <a:rPr lang="en-US" altLang="zh-CN" sz="2400" dirty="0" err="1"/>
               <a:t>DM.ReEmitDxilResources</a:t>
             </a:r>
             <a:r>
-              <a:rPr lang="en-US" altLang="zh-CN" sz="2000" dirty="0"/>
+              <a:rPr lang="en-US" altLang="zh-CN" sz="2400" dirty="0"/>
               <a:t>();</a:t>
             </a:r>
           </a:p>
@@ -5000,7 +5686,7 @@
               <a:buNone/>
             </a:pPr>
             <a:r>
-              <a:rPr lang="en-US" altLang="zh-CN" sz="2000" dirty="0"/>
+              <a:rPr lang="en-US" altLang="zh-CN" sz="2400" dirty="0"/>
               <a:t>  return true;</a:t>
             </a:r>
           </a:p>
@@ -5009,10 +5695,10 @@
               <a:buNone/>
             </a:pPr>
             <a:r>
-              <a:rPr lang="en-US" altLang="zh-CN" sz="2000" dirty="0"/>
+              <a:rPr lang="en-US" altLang="zh-CN" sz="2400" dirty="0"/>
               <a:t>}</a:t>
             </a:r>
-            <a:endParaRPr lang="zh-CN" altLang="en-US" sz="2000" dirty="0"/>
+            <a:endParaRPr lang="zh-CN" altLang="en-US" sz="2400" dirty="0"/>
           </a:p>
         </p:txBody>
       </p:sp>
@@ -5107,73 +5793,75 @@
         </p:nvSpPr>
         <p:spPr/>
         <p:txBody>
-          <a:bodyPr/>
-          <a:lstStyle/>
-          <a:p>
-            <a:r>
-              <a:rPr lang="en-US" altLang="zh-CN" sz="2000" dirty="0" err="1"/>
+          <a:bodyPr>
+            <a:normAutofit/>
+          </a:bodyPr>
+          <a:lstStyle/>
+          <a:p>
+            <a:r>
+              <a:rPr lang="en-US" altLang="zh-CN" sz="2400" dirty="0" err="1"/>
               <a:t>DxilConvergentMark</a:t>
             </a:r>
             <a:r>
-              <a:rPr lang="en-US" altLang="zh-CN" sz="2000" dirty="0"/>
+              <a:rPr lang="en-US" altLang="zh-CN" sz="2400" dirty="0"/>
               <a:t> : </a:t>
             </a:r>
             <a:r>
-              <a:rPr lang="en-US" altLang="zh-CN" sz="2000" dirty="0" err="1"/>
+              <a:rPr lang="en-US" altLang="zh-CN" sz="2400" dirty="0" err="1"/>
               <a:t>ModulePass</a:t>
             </a:r>
-            <a:endParaRPr lang="en-US" altLang="zh-CN" sz="2000" dirty="0"/>
-          </a:p>
-          <a:p>
-            <a:r>
-              <a:rPr lang="en-US" altLang="zh-CN" sz="2000" dirty="0" err="1"/>
+            <a:endParaRPr lang="en-US" altLang="zh-CN" sz="2400" dirty="0"/>
+          </a:p>
+          <a:p>
+            <a:r>
+              <a:rPr lang="en-US" altLang="zh-CN" sz="2400" dirty="0" err="1"/>
               <a:t>DxilConvergentClear</a:t>
             </a:r>
             <a:r>
-              <a:rPr lang="en-US" altLang="zh-CN" sz="2000" dirty="0"/>
+              <a:rPr lang="en-US" altLang="zh-CN" sz="2400" dirty="0"/>
               <a:t> : </a:t>
             </a:r>
             <a:r>
-              <a:rPr lang="en-US" altLang="zh-CN" sz="2000" dirty="0" err="1"/>
+              <a:rPr lang="en-US" altLang="zh-CN" sz="2400" dirty="0" err="1"/>
               <a:t>ModulePass</a:t>
             </a:r>
-            <a:endParaRPr lang="en-US" altLang="zh-CN" sz="2000" dirty="0"/>
-          </a:p>
-          <a:p>
-            <a:r>
-              <a:rPr lang="en-US" altLang="zh-CN" sz="2000" dirty="0"/>
+            <a:endParaRPr lang="en-US" altLang="zh-CN" sz="2400" dirty="0"/>
+          </a:p>
+          <a:p>
+            <a:r>
+              <a:rPr lang="en-US" altLang="zh-CN" sz="2400" dirty="0"/>
               <a:t>Pass Feature: Mark convergent to avoid sample </a:t>
             </a:r>
             <a:r>
-              <a:rPr lang="en-US" altLang="zh-CN" sz="2000" dirty="0" err="1"/>
+              <a:rPr lang="en-US" altLang="zh-CN" sz="2400" dirty="0" err="1"/>
               <a:t>coordnate</a:t>
             </a:r>
             <a:r>
-              <a:rPr lang="en-US" altLang="zh-CN" sz="2000" dirty="0"/>
+              <a:rPr lang="en-US" altLang="zh-CN" sz="2400" dirty="0"/>
               <a:t> calculation sink into control flow.</a:t>
             </a:r>
           </a:p>
           <a:p>
-            <a:endParaRPr lang="en-US" altLang="zh-CN" sz="2000" dirty="0"/>
-          </a:p>
-          <a:p>
-            <a:r>
-              <a:rPr lang="en-US" altLang="zh-CN" sz="2000" dirty="0" err="1"/>
+            <a:endParaRPr lang="en-US" altLang="zh-CN" sz="2400" dirty="0"/>
+          </a:p>
+          <a:p>
+            <a:r>
+              <a:rPr lang="en-US" altLang="zh-CN" sz="2400" dirty="0" err="1"/>
               <a:t>Todo</a:t>
             </a:r>
             <a:r>
-              <a:rPr lang="en-US" altLang="zh-CN" sz="2000" dirty="0"/>
+              <a:rPr lang="en-US" altLang="zh-CN" sz="2400" dirty="0"/>
               <a:t>:</a:t>
             </a:r>
           </a:p>
           <a:p>
             <a:r>
-              <a:rPr lang="en-US" altLang="zh-CN" sz="2000" dirty="0"/>
+              <a:rPr lang="en-US" altLang="zh-CN" sz="2400" dirty="0"/>
               <a:t>Why need these passes ?</a:t>
             </a:r>
           </a:p>
           <a:p>
-            <a:endParaRPr lang="zh-CN" altLang="en-US" sz="2000" dirty="0"/>
+            <a:endParaRPr lang="zh-CN" altLang="en-US" sz="2400" dirty="0"/>
           </a:p>
         </p:txBody>
       </p:sp>
@@ -5181,6 +5869,258 @@
     <p:extLst>
       <p:ext uri="{BB962C8B-B14F-4D97-AF65-F5344CB8AC3E}">
         <p14:creationId xmlns:p14="http://schemas.microsoft.com/office/powerpoint/2010/main" val="4049390087"/>
+      </p:ext>
+    </p:extLst>
+  </p:cSld>
+  <p:clrMapOvr>
+    <a:masterClrMapping/>
+  </p:clrMapOvr>
+</p:sld>
+</file>
+
+<file path=ppt/slides/slide8.xml><?xml version="1.0" encoding="utf-8"?>
+<p:sld xmlns:a="http://schemas.openxmlformats.org/drawingml/2006/main" xmlns:r="http://schemas.openxmlformats.org/officeDocument/2006/relationships" xmlns:p="http://schemas.openxmlformats.org/presentationml/2006/main">
+  <p:cSld>
+    <p:spTree>
+      <p:nvGrpSpPr>
+        <p:cNvPr id="1" name=""/>
+        <p:cNvGrpSpPr/>
+        <p:nvPr/>
+      </p:nvGrpSpPr>
+      <p:grpSpPr>
+        <a:xfrm>
+          <a:off x="0" y="0"/>
+          <a:ext cx="0" cy="0"/>
+          <a:chOff x="0" y="0"/>
+          <a:chExt cx="0" cy="0"/>
+        </a:xfrm>
+      </p:grpSpPr>
+      <p:sp>
+        <p:nvSpPr>
+          <p:cNvPr id="2" name="标题 1">
+            <a:extLst>
+              <a:ext uri="{FF2B5EF4-FFF2-40B4-BE49-F238E27FC236}">
+                <a16:creationId xmlns:a16="http://schemas.microsoft.com/office/drawing/2014/main" id="{E2B22008-5E22-4C2C-AE10-19EB2DD6ED0D}"/>
+              </a:ext>
+            </a:extLst>
+          </p:cNvPr>
+          <p:cNvSpPr>
+            <a:spLocks noGrp="1"/>
+          </p:cNvSpPr>
+          <p:nvPr>
+            <p:ph type="title"/>
+          </p:nvPr>
+        </p:nvSpPr>
+        <p:spPr/>
+        <p:txBody>
+          <a:bodyPr/>
+          <a:lstStyle/>
+          <a:p>
+            <a:r>
+              <a:rPr lang="en-US" altLang="zh-CN" dirty="0" err="1"/>
+              <a:t>hlsl</a:t>
+            </a:r>
+            <a:r>
+              <a:rPr lang="en-US" altLang="zh-CN" dirty="0"/>
+              <a:t>-</a:t>
+            </a:r>
+            <a:r>
+              <a:rPr lang="en-US" altLang="zh-CN" dirty="0" err="1"/>
+              <a:t>dxil</a:t>
+            </a:r>
+            <a:r>
+              <a:rPr lang="en-US" altLang="zh-CN" dirty="0"/>
+              <a:t>-cleanup-</a:t>
+            </a:r>
+            <a:r>
+              <a:rPr lang="en-US" altLang="zh-CN" dirty="0" err="1"/>
+              <a:t>addrspacecast</a:t>
+            </a:r>
+            <a:endParaRPr lang="zh-CN" altLang="en-US" dirty="0"/>
+          </a:p>
+        </p:txBody>
+      </p:sp>
+      <p:sp>
+        <p:nvSpPr>
+          <p:cNvPr id="3" name="内容占位符 2">
+            <a:extLst>
+              <a:ext uri="{FF2B5EF4-FFF2-40B4-BE49-F238E27FC236}">
+                <a16:creationId xmlns:a16="http://schemas.microsoft.com/office/drawing/2014/main" id="{FC053159-103C-4C89-99EB-38AE4B7E17EC}"/>
+              </a:ext>
+            </a:extLst>
+          </p:cNvPr>
+          <p:cNvSpPr>
+            <a:spLocks noGrp="1"/>
+          </p:cNvSpPr>
+          <p:nvPr>
+            <p:ph idx="1"/>
+          </p:nvPr>
+        </p:nvSpPr>
+        <p:spPr/>
+        <p:txBody>
+          <a:bodyPr>
+            <a:normAutofit/>
+          </a:bodyPr>
+          <a:lstStyle/>
+          <a:p>
+            <a:r>
+              <a:rPr lang="en-US" altLang="zh-CN" sz="2400" dirty="0" err="1"/>
+              <a:t>DxilCleanupAddrSpaceCast</a:t>
+            </a:r>
+            <a:r>
+              <a:rPr lang="en-US" altLang="zh-CN" sz="2400" dirty="0"/>
+              <a:t> : </a:t>
+            </a:r>
+            <a:r>
+              <a:rPr lang="en-US" altLang="zh-CN" sz="2400" dirty="0" err="1"/>
+              <a:t>ModulePass</a:t>
+            </a:r>
+            <a:endParaRPr lang="en-US" altLang="zh-CN" sz="2400" dirty="0"/>
+          </a:p>
+          <a:p>
+            <a:r>
+              <a:rPr lang="en-US" altLang="zh-CN" sz="2400" dirty="0"/>
+              <a:t>Pass Feature: Eliminate address space casts if possible. Collect phi nodes so we can replace iteratively after pass over GVs</a:t>
+            </a:r>
+            <a:endParaRPr lang="zh-CN" altLang="en-US" sz="2400" dirty="0"/>
+          </a:p>
+        </p:txBody>
+      </p:sp>
+    </p:spTree>
+    <p:extLst>
+      <p:ext uri="{BB962C8B-B14F-4D97-AF65-F5344CB8AC3E}">
+        <p14:creationId xmlns:p14="http://schemas.microsoft.com/office/powerpoint/2010/main" val="808586413"/>
+      </p:ext>
+    </p:extLst>
+  </p:cSld>
+  <p:clrMapOvr>
+    <a:masterClrMapping/>
+  </p:clrMapOvr>
+</p:sld>
+</file>
+
+<file path=ppt/slides/slide9.xml><?xml version="1.0" encoding="utf-8"?>
+<p:sld xmlns:a="http://schemas.openxmlformats.org/drawingml/2006/main" xmlns:r="http://schemas.openxmlformats.org/officeDocument/2006/relationships" xmlns:p="http://schemas.openxmlformats.org/presentationml/2006/main">
+  <p:cSld>
+    <p:spTree>
+      <p:nvGrpSpPr>
+        <p:cNvPr id="1" name=""/>
+        <p:cNvGrpSpPr/>
+        <p:nvPr/>
+      </p:nvGrpSpPr>
+      <p:grpSpPr>
+        <a:xfrm>
+          <a:off x="0" y="0"/>
+          <a:ext cx="0" cy="0"/>
+          <a:chOff x="0" y="0"/>
+          <a:chExt cx="0" cy="0"/>
+        </a:xfrm>
+      </p:grpSpPr>
+      <p:sp>
+        <p:nvSpPr>
+          <p:cNvPr id="2" name="标题 1">
+            <a:extLst>
+              <a:ext uri="{FF2B5EF4-FFF2-40B4-BE49-F238E27FC236}">
+                <a16:creationId xmlns:a16="http://schemas.microsoft.com/office/drawing/2014/main" id="{C0DED3AD-9436-4BC4-BDD6-451CE01DCE91}"/>
+              </a:ext>
+            </a:extLst>
+          </p:cNvPr>
+          <p:cNvSpPr>
+            <a:spLocks noGrp="1"/>
+          </p:cNvSpPr>
+          <p:nvPr>
+            <p:ph type="title"/>
+          </p:nvPr>
+        </p:nvSpPr>
+        <p:spPr/>
+        <p:txBody>
+          <a:bodyPr/>
+          <a:lstStyle/>
+          <a:p>
+            <a:r>
+              <a:rPr lang="en-US" altLang="zh-CN" dirty="0" err="1"/>
+              <a:t>hlsl</a:t>
+            </a:r>
+            <a:r>
+              <a:rPr lang="en-US" altLang="zh-CN" dirty="0"/>
+              <a:t>-</a:t>
+            </a:r>
+            <a:r>
+              <a:rPr lang="en-US" altLang="zh-CN" dirty="0" err="1"/>
+              <a:t>dxil</a:t>
+            </a:r>
+            <a:r>
+              <a:rPr lang="en-US" altLang="zh-CN" dirty="0"/>
+              <a:t>-reduce-</a:t>
+            </a:r>
+            <a:r>
+              <a:rPr lang="en-US" altLang="zh-CN" dirty="0" err="1"/>
+              <a:t>msaa</a:t>
+            </a:r>
+            <a:r>
+              <a:rPr lang="en-US" altLang="zh-CN" dirty="0"/>
+              <a:t>-to-single</a:t>
+            </a:r>
+            <a:endParaRPr lang="zh-CN" altLang="en-US" dirty="0"/>
+          </a:p>
+        </p:txBody>
+      </p:sp>
+      <p:sp>
+        <p:nvSpPr>
+          <p:cNvPr id="3" name="内容占位符 2">
+            <a:extLst>
+              <a:ext uri="{FF2B5EF4-FFF2-40B4-BE49-F238E27FC236}">
+                <a16:creationId xmlns:a16="http://schemas.microsoft.com/office/drawing/2014/main" id="{0AE2DD89-B294-49C2-87DA-DA7A2A4BB8CD}"/>
+              </a:ext>
+            </a:extLst>
+          </p:cNvPr>
+          <p:cNvSpPr>
+            <a:spLocks noGrp="1"/>
+          </p:cNvSpPr>
+          <p:nvPr>
+            <p:ph idx="1"/>
+          </p:nvPr>
+        </p:nvSpPr>
+        <p:spPr/>
+        <p:txBody>
+          <a:bodyPr/>
+          <a:lstStyle/>
+          <a:p>
+            <a:r>
+              <a:rPr lang="en-US" altLang="zh-CN" sz="2400" dirty="0" err="1"/>
+              <a:t>DxilReduceMSAAToSingleSample</a:t>
+            </a:r>
+            <a:r>
+              <a:rPr lang="en-US" altLang="zh-CN" sz="2400" dirty="0"/>
+              <a:t> : </a:t>
+            </a:r>
+            <a:r>
+              <a:rPr lang="en-US" altLang="zh-CN" sz="2400" dirty="0" err="1"/>
+              <a:t>ModulePass</a:t>
+            </a:r>
+            <a:endParaRPr lang="en-US" altLang="zh-CN" sz="2400" dirty="0"/>
+          </a:p>
+          <a:p>
+            <a:r>
+              <a:rPr lang="en-US" altLang="zh-CN" sz="2400" dirty="0"/>
+              <a:t>Pass Feature: Provides a pass to reduce all MSAA writes to single-sample writes </a:t>
+            </a:r>
+          </a:p>
+          <a:p>
+            <a:endParaRPr lang="en-US" altLang="zh-CN" sz="2400" dirty="0"/>
+          </a:p>
+          <a:p>
+            <a:endParaRPr lang="en-US" altLang="zh-CN" sz="2400" dirty="0"/>
+          </a:p>
+          <a:p>
+            <a:endParaRPr lang="zh-CN" altLang="en-US" dirty="0"/>
+          </a:p>
+        </p:txBody>
+      </p:sp>
+    </p:spTree>
+    <p:extLst>
+      <p:ext uri="{BB962C8B-B14F-4D97-AF65-F5344CB8AC3E}">
+        <p14:creationId xmlns:p14="http://schemas.microsoft.com/office/powerpoint/2010/main" val="2430867115"/>
       </p:ext>
     </p:extLst>
   </p:cSld>

</xml_diff>